<commit_message>
module06 and ps06 ready for release
</commit_message>
<xml_diff>
--- a/Slides/Lesson 6.3 Mutually Recursive Data Definitions.pptx
+++ b/Slides/Lesson 6.3 Mutually Recursive Data Definitions.pptx
@@ -237,7 +237,7 @@
           <a:p>
             <a:fld id="{1AC50D25-69DA-4251-A3B1-10895C6A89D6}" type="datetimeFigureOut">
               <a:rPr lang="en-US" smtClean="0"/>
-              <a:t>9/6/2016</a:t>
+              <a:t>9/26/2016</a:t>
             </a:fld>
             <a:endParaRPr lang="en-US"/>
           </a:p>
@@ -953,7 +953,7 @@
           <a:p>
             <a:fld id="{2F1F79F5-7BEC-496A-AFC7-876E38F64D71}" type="datetime1">
               <a:rPr lang="en-US" smtClean="0"/>
-              <a:t>9/6/2016</a:t>
+              <a:t>9/26/2016</a:t>
             </a:fld>
             <a:endParaRPr lang="en-US"/>
           </a:p>
@@ -1048,7 +1048,7 @@
           <a:p>
             <a:fld id="{0A05703A-7669-4FEA-9056-25299B4D29D4}" type="datetime1">
               <a:rPr lang="en-US" smtClean="0"/>
-              <a:t>9/6/2016</a:t>
+              <a:t>9/26/2016</a:t>
             </a:fld>
             <a:endParaRPr lang="en-US"/>
           </a:p>
@@ -1323,7 +1323,7 @@
           <a:p>
             <a:fld id="{6E5077B5-BB57-49DB-88CA-226A139E5C01}" type="datetime1">
               <a:rPr lang="en-US" smtClean="0"/>
-              <a:t>9/6/2016</a:t>
+              <a:t>9/26/2016</a:t>
             </a:fld>
             <a:endParaRPr lang="en-US"/>
           </a:p>
@@ -1575,7 +1575,7 @@
           <a:p>
             <a:fld id="{C48D9447-CBD6-49A1-89FD-8512A8CF8999}" type="datetime1">
               <a:rPr lang="en-US" smtClean="0"/>
-              <a:t>9/6/2016</a:t>
+              <a:t>9/26/2016</a:t>
             </a:fld>
             <a:endParaRPr lang="en-US"/>
           </a:p>
@@ -1743,7 +1743,7 @@
           <a:p>
             <a:fld id="{A3639A2A-823D-48B7-9ACE-7FAF42870BA9}" type="datetime1">
               <a:rPr lang="en-US" smtClean="0"/>
-              <a:t>9/6/2016</a:t>
+              <a:t>9/26/2016</a:t>
             </a:fld>
             <a:endParaRPr lang="en-US"/>
           </a:p>
@@ -1921,7 +1921,7 @@
           <a:p>
             <a:fld id="{ED1B6996-82E9-463C-972C-7B56056E426C}" type="datetime1">
               <a:rPr lang="en-US" smtClean="0"/>
-              <a:t>9/6/2016</a:t>
+              <a:t>9/26/2016</a:t>
             </a:fld>
             <a:endParaRPr lang="en-US"/>
           </a:p>
@@ -2095,7 +2095,7 @@
           <a:p>
             <a:fld id="{E22ED4DA-448D-4BB1-B935-CC112220207B}" type="datetime1">
               <a:rPr lang="en-US" smtClean="0"/>
-              <a:t>9/6/2016</a:t>
+              <a:t>9/26/2016</a:t>
             </a:fld>
             <a:endParaRPr lang="en-US"/>
           </a:p>
@@ -2268,7 +2268,7 @@
           <a:p>
             <a:fld id="{E22ED4DA-448D-4BB1-B935-CC112220207B}" type="datetime1">
               <a:rPr lang="en-US" smtClean="0"/>
-              <a:t>9/6/2016</a:t>
+              <a:t>9/26/2016</a:t>
             </a:fld>
             <a:endParaRPr lang="en-US"/>
           </a:p>
@@ -2528,7 +2528,7 @@
           <a:p>
             <a:fld id="{FF5D65A6-AB94-4435-B0B7-3743215FA46C}" type="datetime1">
               <a:rPr lang="en-US" smtClean="0"/>
-              <a:t>9/6/2016</a:t>
+              <a:t>9/26/2016</a:t>
             </a:fld>
             <a:endParaRPr lang="en-US"/>
           </a:p>
@@ -2704,7 +2704,7 @@
           <a:p>
             <a:fld id="{FF5D65A6-AB94-4435-B0B7-3743215FA46C}" type="datetime1">
               <a:rPr lang="en-US" smtClean="0"/>
-              <a:t>9/6/2016</a:t>
+              <a:t>9/26/2016</a:t>
             </a:fld>
             <a:endParaRPr lang="en-US"/>
           </a:p>
@@ -2998,7 +2998,7 @@
           <a:p>
             <a:fld id="{7C193DC4-6EF0-48C9-B29C-616106A645E1}" type="datetime1">
               <a:rPr lang="en-US" smtClean="0"/>
-              <a:t>9/6/2016</a:t>
+              <a:t>9/26/2016</a:t>
             </a:fld>
             <a:endParaRPr lang="en-US"/>
           </a:p>
@@ -3283,7 +3283,7 @@
           <a:p>
             <a:fld id="{5D1846AD-9252-4647-9435-4C2AC365653A}" type="datetime1">
               <a:rPr lang="en-US" smtClean="0"/>
-              <a:t>9/6/2016</a:t>
+              <a:t>9/26/2016</a:t>
             </a:fld>
             <a:endParaRPr lang="en-US"/>
           </a:p>
@@ -3702,7 +3702,7 @@
           <a:p>
             <a:fld id="{CE56DC10-3561-4063-A6AF-C1CC7A41040A}" type="datetime1">
               <a:rPr lang="en-US" smtClean="0"/>
-              <a:t>9/6/2016</a:t>
+              <a:t>9/26/2016</a:t>
             </a:fld>
             <a:endParaRPr lang="en-US"/>
           </a:p>
@@ -3819,7 +3819,7 @@
           <a:p>
             <a:fld id="{2F7B77F5-1464-4F6B-92A8-64FC8A508293}" type="datetime1">
               <a:rPr lang="en-US" smtClean="0"/>
-              <a:t>9/6/2016</a:t>
+              <a:t>9/26/2016</a:t>
             </a:fld>
             <a:endParaRPr lang="en-US"/>
           </a:p>
@@ -4042,7 +4042,7 @@
           <a:p>
             <a:fld id="{02B3F677-983B-48DB-ADFD-63FE6CBC7FB2}" type="datetime1">
               <a:rPr lang="en-US" smtClean="0"/>
-              <a:t>9/6/2016</a:t>
+              <a:t>9/26/2016</a:t>
             </a:fld>
             <a:endParaRPr lang="en-US"/>
           </a:p>
@@ -9451,8 +9451,8 @@
           <a:lstStyle/>
           <a:p>
             <a:r>
-              <a:rPr lang="en-US"/>
-              <a:t>Study the file 06-4-lasns.rkt</a:t>
+              <a:rPr lang="en-US" dirty="0"/>
+              <a:t>Study the file 06-3-lasns.rkt</a:t>
             </a:r>
           </a:p>
           <a:p>
@@ -9464,8 +9464,13 @@
           <a:p>
             <a:r>
               <a:rPr lang="en-US" dirty="0"/>
-              <a:t>Do Guided Practice 6.4</a:t>
-            </a:r>
+              <a:t>Do Guided </a:t>
+            </a:r>
+            <a:r>
+              <a:rPr lang="en-US"/>
+              <a:t>Practice 6.3</a:t>
+            </a:r>
+            <a:endParaRPr lang="en-US" dirty="0"/>
           </a:p>
           <a:p>
             <a:r>

</xml_diff>